<commit_message>
Preparations for writing foundations chapter
</commit_message>
<xml_diff>
--- a/Dokument/Entwürfe/02 Verwandte Arbeiten.pptx
+++ b/Dokument/Entwürfe/02 Verwandte Arbeiten.pptx
@@ -5,10 +5,10 @@
     <p:sldMasterId id="2147483651" r:id="rId1"/>
   </p:sldMasterIdLst>
   <p:notesMasterIdLst>
-    <p:notesMasterId r:id="rId12"/>
+    <p:notesMasterId r:id="rId14"/>
   </p:notesMasterIdLst>
   <p:handoutMasterIdLst>
-    <p:handoutMasterId r:id="rId13"/>
+    <p:handoutMasterId r:id="rId15"/>
   </p:handoutMasterIdLst>
   <p:sldIdLst>
     <p:sldId id="261" r:id="rId2"/>
@@ -17,10 +17,12 @@
     <p:sldId id="275" r:id="rId5"/>
     <p:sldId id="279" r:id="rId6"/>
     <p:sldId id="286" r:id="rId7"/>
-    <p:sldId id="285" r:id="rId8"/>
-    <p:sldId id="283" r:id="rId9"/>
-    <p:sldId id="284" r:id="rId10"/>
-    <p:sldId id="280" r:id="rId11"/>
+    <p:sldId id="288" r:id="rId8"/>
+    <p:sldId id="285" r:id="rId9"/>
+    <p:sldId id="283" r:id="rId10"/>
+    <p:sldId id="284" r:id="rId11"/>
+    <p:sldId id="289" r:id="rId12"/>
+    <p:sldId id="280" r:id="rId13"/>
   </p:sldIdLst>
   <p:sldSz cx="9144000" cy="5143500" type="screen16x9"/>
   <p:notesSz cx="6858000" cy="9144000"/>
@@ -212,7 +214,7 @@
           <a:p>
             <a:fld id="{F4DF2165-45DD-4E6A-8D88-991CFCF20576}" type="datetimeFigureOut">
               <a:rPr lang="de-DE" smtClean="0"/>
-              <a:t>07.05.17</a:t>
+              <a:t>10.05.17</a:t>
             </a:fld>
             <a:endParaRPr lang="de-DE"/>
           </a:p>
@@ -377,7 +379,7 @@
           <a:p>
             <a:fld id="{DBB2A775-C49D-45BA-A919-7D687A0440E7}" type="datetimeFigureOut">
               <a:rPr lang="de-DE" smtClean="0"/>
-              <a:t>07.05.17</a:t>
+              <a:t>10.05.17</a:t>
             </a:fld>
             <a:endParaRPr lang="de-DE"/>
           </a:p>
@@ -3048,8 +3050,8 @@
           <a:lstStyle/>
           <a:p>
             <a:r>
-              <a:rPr lang="de-DE" dirty="0" smtClean="0"/>
-              <a:t>Quellen</a:t>
+              <a:rPr lang="de-DE" dirty="0" err="1" smtClean="0"/>
+              <a:t>Cipherbase</a:t>
             </a:r>
             <a:endParaRPr lang="de-DE" dirty="0"/>
           </a:p>
@@ -3070,6 +3072,347 @@
           <a:bodyPr/>
           <a:lstStyle/>
           <a:p>
+            <a:r>
+              <a:rPr lang="de-DE" dirty="0" smtClean="0"/>
+              <a:t>Ansatz</a:t>
+            </a:r>
+          </a:p>
+          <a:p>
+            <a:pPr lvl="1"/>
+            <a:r>
+              <a:rPr lang="de-DE" dirty="0" smtClean="0"/>
+              <a:t>Erweiterung für Microsoft SQL Server</a:t>
+            </a:r>
+          </a:p>
+          <a:p>
+            <a:pPr lvl="1"/>
+            <a:r>
+              <a:rPr lang="de-DE" dirty="0" smtClean="0"/>
+              <a:t>HW/SW </a:t>
+            </a:r>
+            <a:r>
+              <a:rPr lang="de-DE" dirty="0" err="1" smtClean="0"/>
+              <a:t>Codesign</a:t>
+            </a:r>
+            <a:r>
+              <a:rPr lang="de-DE" dirty="0" smtClean="0"/>
+              <a:t>: Separate „</a:t>
+            </a:r>
+            <a:r>
+              <a:rPr lang="de-DE" dirty="0" err="1" smtClean="0"/>
+              <a:t>Trusted</a:t>
+            </a:r>
+            <a:r>
+              <a:rPr lang="de-DE" dirty="0" smtClean="0"/>
+              <a:t> </a:t>
+            </a:r>
+            <a:r>
+              <a:rPr lang="de-DE" dirty="0" err="1" smtClean="0"/>
+              <a:t>Machine</a:t>
+            </a:r>
+            <a:r>
+              <a:rPr lang="de-DE" dirty="0" smtClean="0"/>
+              <a:t>“ (TM) zum Zweck der Berechnung von kryptographischen Primitiven</a:t>
+            </a:r>
+          </a:p>
+          <a:p>
+            <a:pPr lvl="1"/>
+            <a:r>
+              <a:rPr lang="de-DE" dirty="0" smtClean="0"/>
+              <a:t>Prinzipiell gleich zu </a:t>
+            </a:r>
+            <a:r>
+              <a:rPr lang="de-DE" dirty="0" err="1" smtClean="0"/>
+              <a:t>TrustedDB</a:t>
+            </a:r>
+            <a:r>
+              <a:rPr lang="de-DE" dirty="0" smtClean="0"/>
+              <a:t>, Logik in vertrauenswürdiger Hardware aber nur simple </a:t>
+            </a:r>
+            <a:r>
+              <a:rPr lang="de-DE" dirty="0" err="1" smtClean="0"/>
+              <a:t>Stackmaschine</a:t>
+            </a:r>
+            <a:endParaRPr lang="de-DE" dirty="0" smtClean="0"/>
+          </a:p>
+          <a:p>
+            <a:pPr lvl="1"/>
+            <a:r>
+              <a:rPr lang="de-DE" dirty="0" smtClean="0"/>
+              <a:t>Umsetzung der TM durch FPGAs möglich [5]</a:t>
+            </a:r>
+          </a:p>
+          <a:p>
+            <a:r>
+              <a:rPr lang="de-DE" dirty="0" smtClean="0"/>
+              <a:t>Vorteile</a:t>
+            </a:r>
+          </a:p>
+          <a:p>
+            <a:pPr lvl="1"/>
+            <a:r>
+              <a:rPr lang="de-DE" dirty="0" smtClean="0"/>
+              <a:t>Maß an Sicherheit ist für einzelne Attribute konfigurierbar (nicht bei </a:t>
+            </a:r>
+            <a:r>
+              <a:rPr lang="de-DE" dirty="0" err="1" smtClean="0"/>
+              <a:t>CryptDB</a:t>
+            </a:r>
+            <a:r>
+              <a:rPr lang="de-DE" dirty="0" smtClean="0"/>
+              <a:t>) [4]</a:t>
+            </a:r>
+          </a:p>
+          <a:p>
+            <a:pPr lvl="1"/>
+            <a:r>
+              <a:rPr lang="de-DE" dirty="0" smtClean="0"/>
+              <a:t>Hohe Kopplung: TM berechnet nur die Kernprimitive die wirklich auf Verschlüsselung beruhen, nicht mehr (nicht bei </a:t>
+            </a:r>
+            <a:r>
+              <a:rPr lang="de-DE" dirty="0" err="1" smtClean="0"/>
+              <a:t>TrustedDB</a:t>
+            </a:r>
+            <a:r>
+              <a:rPr lang="de-DE" dirty="0" smtClean="0"/>
+              <a:t>) [4]</a:t>
+            </a:r>
+          </a:p>
+          <a:p>
+            <a:pPr lvl="1"/>
+            <a:r>
+              <a:rPr lang="de-DE" dirty="0" err="1" smtClean="0"/>
+              <a:t>Trusted</a:t>
+            </a:r>
+            <a:r>
+              <a:rPr lang="de-DE" dirty="0" smtClean="0"/>
+              <a:t> Computing Base (TCB) sehr klein [5]</a:t>
+            </a:r>
+          </a:p>
+          <a:p>
+            <a:r>
+              <a:rPr lang="de-DE" dirty="0" smtClean="0"/>
+              <a:t>Nachteile</a:t>
+            </a:r>
+          </a:p>
+          <a:p>
+            <a:pPr lvl="1"/>
+            <a:r>
+              <a:rPr lang="de-DE" dirty="0" smtClean="0"/>
+              <a:t>Gleiche Vertraulichkeit wie OPE, Ordnung der Daten wird preisgegeben [6]</a:t>
+            </a:r>
+          </a:p>
+        </p:txBody>
+      </p:sp>
+    </p:spTree>
+    <p:extLst>
+      <p:ext uri="{BB962C8B-B14F-4D97-AF65-F5344CB8AC3E}">
+        <p14:creationId xmlns:p14="http://schemas.microsoft.com/office/powerpoint/2010/main" val="626197437"/>
+      </p:ext>
+    </p:extLst>
+  </p:cSld>
+  <p:clrMapOvr>
+    <a:masterClrMapping/>
+  </p:clrMapOvr>
+  <p:timing>
+    <p:tnLst>
+      <p:par>
+        <p:cTn id="1" dur="indefinite" restart="never" nodeType="tmRoot"/>
+      </p:par>
+    </p:tnLst>
+  </p:timing>
+</p:sld>
+</file>
+
+<file path=ppt/slides/slide11.xml><?xml version="1.0" encoding="utf-8"?>
+<p:sld xmlns:a="http://schemas.openxmlformats.org/drawingml/2006/main" xmlns:r="http://schemas.openxmlformats.org/officeDocument/2006/relationships" xmlns:p="http://schemas.openxmlformats.org/presentationml/2006/main">
+  <p:cSld>
+    <p:spTree>
+      <p:nvGrpSpPr>
+        <p:cNvPr id="1" name=""/>
+        <p:cNvGrpSpPr/>
+        <p:nvPr/>
+      </p:nvGrpSpPr>
+      <p:grpSpPr>
+        <a:xfrm>
+          <a:off x="0" y="0"/>
+          <a:ext cx="0" cy="0"/>
+          <a:chOff x="0" y="0"/>
+          <a:chExt cx="0" cy="0"/>
+        </a:xfrm>
+      </p:grpSpPr>
+      <p:sp>
+        <p:nvSpPr>
+          <p:cNvPr id="2" name="Titel 1"/>
+          <p:cNvSpPr>
+            <a:spLocks noGrp="1"/>
+          </p:cNvSpPr>
+          <p:nvPr>
+            <p:ph type="title"/>
+          </p:nvPr>
+        </p:nvSpPr>
+        <p:spPr/>
+        <p:txBody>
+          <a:bodyPr/>
+          <a:lstStyle/>
+          <a:p>
+            <a:r>
+              <a:rPr lang="de-DE" dirty="0" smtClean="0"/>
+              <a:t>VC3</a:t>
+            </a:r>
+            <a:endParaRPr lang="de-DE" dirty="0"/>
+          </a:p>
+        </p:txBody>
+      </p:sp>
+      <p:sp>
+        <p:nvSpPr>
+          <p:cNvPr id="3" name="Inhaltsplatzhalter 2"/>
+          <p:cNvSpPr>
+            <a:spLocks noGrp="1"/>
+          </p:cNvSpPr>
+          <p:nvPr>
+            <p:ph idx="1"/>
+          </p:nvPr>
+        </p:nvSpPr>
+        <p:spPr/>
+        <p:txBody>
+          <a:bodyPr/>
+          <a:lstStyle/>
+          <a:p>
+            <a:r>
+              <a:rPr lang="de-DE" dirty="0" smtClean="0"/>
+              <a:t>Ansatz</a:t>
+            </a:r>
+          </a:p>
+          <a:p>
+            <a:pPr lvl="1"/>
+            <a:r>
+              <a:rPr lang="de-DE" dirty="0" smtClean="0"/>
+              <a:t>Ausführung von </a:t>
+            </a:r>
+            <a:r>
+              <a:rPr lang="de-DE" dirty="0" err="1" smtClean="0"/>
+              <a:t>MapReduce</a:t>
+            </a:r>
+            <a:r>
+              <a:rPr lang="de-DE" dirty="0" smtClean="0"/>
+              <a:t> mithilfe von unverändertem </a:t>
+            </a:r>
+            <a:r>
+              <a:rPr lang="de-DE" dirty="0" err="1" smtClean="0"/>
+              <a:t>Hadoop</a:t>
+            </a:r>
+            <a:r>
+              <a:rPr lang="de-DE" dirty="0" smtClean="0"/>
+              <a:t> in einer Intel SGX Umgebung</a:t>
+            </a:r>
+            <a:endParaRPr lang="de-DE" dirty="0" smtClean="0"/>
+          </a:p>
+          <a:p>
+            <a:r>
+              <a:rPr lang="de-DE" dirty="0" smtClean="0"/>
+              <a:t>Vorteile</a:t>
+            </a:r>
+          </a:p>
+          <a:p>
+            <a:pPr lvl="1"/>
+            <a:r>
+              <a:rPr lang="de-DE" dirty="0" smtClean="0"/>
+              <a:t>Performance Overhead ist gering (was in der Arbeit zu zeigen ist)</a:t>
+            </a:r>
+            <a:endParaRPr lang="de-DE" dirty="0" smtClean="0"/>
+          </a:p>
+          <a:p>
+            <a:r>
+              <a:rPr lang="de-DE" dirty="0" smtClean="0"/>
+              <a:t>Nachteile</a:t>
+            </a:r>
+          </a:p>
+          <a:p>
+            <a:pPr lvl="1"/>
+            <a:r>
+              <a:rPr lang="de-DE" dirty="0" smtClean="0"/>
+              <a:t>Soweit nichts erkennbar</a:t>
+            </a:r>
+            <a:endParaRPr lang="de-DE" dirty="0" smtClean="0"/>
+          </a:p>
+        </p:txBody>
+      </p:sp>
+    </p:spTree>
+    <p:extLst>
+      <p:ext uri="{BB962C8B-B14F-4D97-AF65-F5344CB8AC3E}">
+        <p14:creationId xmlns:p14="http://schemas.microsoft.com/office/powerpoint/2010/main" val="1705185921"/>
+      </p:ext>
+    </p:extLst>
+  </p:cSld>
+  <p:clrMapOvr>
+    <a:masterClrMapping/>
+  </p:clrMapOvr>
+  <p:timing>
+    <p:tnLst>
+      <p:par>
+        <p:cTn id="1" dur="indefinite" restart="never" nodeType="tmRoot"/>
+      </p:par>
+    </p:tnLst>
+  </p:timing>
+</p:sld>
+</file>
+
+<file path=ppt/slides/slide12.xml><?xml version="1.0" encoding="utf-8"?>
+<p:sld xmlns:a="http://schemas.openxmlformats.org/drawingml/2006/main" xmlns:r="http://schemas.openxmlformats.org/officeDocument/2006/relationships" xmlns:p="http://schemas.openxmlformats.org/presentationml/2006/main">
+  <p:cSld>
+    <p:spTree>
+      <p:nvGrpSpPr>
+        <p:cNvPr id="1" name=""/>
+        <p:cNvGrpSpPr/>
+        <p:nvPr/>
+      </p:nvGrpSpPr>
+      <p:grpSpPr>
+        <a:xfrm>
+          <a:off x="0" y="0"/>
+          <a:ext cx="0" cy="0"/>
+          <a:chOff x="0" y="0"/>
+          <a:chExt cx="0" cy="0"/>
+        </a:xfrm>
+      </p:grpSpPr>
+      <p:sp>
+        <p:nvSpPr>
+          <p:cNvPr id="2" name="Titel 1"/>
+          <p:cNvSpPr>
+            <a:spLocks noGrp="1"/>
+          </p:cNvSpPr>
+          <p:nvPr>
+            <p:ph type="title"/>
+          </p:nvPr>
+        </p:nvSpPr>
+        <p:spPr/>
+        <p:txBody>
+          <a:bodyPr/>
+          <a:lstStyle/>
+          <a:p>
+            <a:r>
+              <a:rPr lang="de-DE" dirty="0" smtClean="0"/>
+              <a:t>Quellen (1)</a:t>
+            </a:r>
+            <a:endParaRPr lang="de-DE" dirty="0"/>
+          </a:p>
+        </p:txBody>
+      </p:sp>
+      <p:sp>
+        <p:nvSpPr>
+          <p:cNvPr id="3" name="Inhaltsplatzhalter 2"/>
+          <p:cNvSpPr>
+            <a:spLocks noGrp="1"/>
+          </p:cNvSpPr>
+          <p:nvPr>
+            <p:ph idx="1"/>
+          </p:nvPr>
+        </p:nvSpPr>
+        <p:spPr/>
+        <p:txBody>
+          <a:bodyPr/>
+          <a:lstStyle/>
+          <a:p>
             <a:pPr lvl="1"/>
             <a:r>
               <a:rPr lang="de-DE" dirty="0" smtClean="0"/>
@@ -3524,12 +3867,12 @@
               <a:t> </a:t>
             </a:r>
             <a:r>
-              <a:rPr lang="de-DE" dirty="0" err="1"/>
-              <a:t>Cipherba</a:t>
-            </a:r>
-            <a:r>
-              <a:rPr lang="de-DE" dirty="0"/>
-              <a:t>- se,” </a:t>
+              <a:rPr lang="de-DE" dirty="0" err="1" smtClean="0"/>
+              <a:t>Cipherbase</a:t>
+            </a:r>
+            <a:r>
+              <a:rPr lang="de-DE" dirty="0"/>
+              <a:t>,” </a:t>
             </a:r>
             <a:r>
               <a:rPr lang="de-DE" i="1" dirty="0" err="1"/>
@@ -3922,28 +4265,20 @@
               <a:t> W. Hu, “Poster: </a:t>
             </a:r>
             <a:r>
-              <a:rPr lang="de-DE" dirty="0" err="1"/>
+              <a:rPr lang="de-DE" err="1"/>
               <a:t>Towards</a:t>
             </a:r>
             <a:r>
-              <a:rPr lang="de-DE" dirty="0"/>
+              <a:rPr lang="de-DE"/>
               <a:t> </a:t>
             </a:r>
             <a:r>
-              <a:rPr lang="de-DE" dirty="0" err="1"/>
-              <a:t>Encryp</a:t>
-            </a:r>
-            <a:r>
-              <a:rPr lang="de-DE" dirty="0"/>
-              <a:t>- </a:t>
-            </a:r>
-            <a:r>
-              <a:rPr lang="de-DE" dirty="0" err="1"/>
-              <a:t>ted</a:t>
-            </a:r>
-            <a:r>
-              <a:rPr lang="de-DE" dirty="0"/>
-              <a:t> Query Processing </a:t>
+              <a:rPr lang="de-DE" smtClean="0"/>
+              <a:t>Encrypted </a:t>
+            </a:r>
+            <a:r>
+              <a:rPr lang="de-DE" dirty="0"/>
+              <a:t>Query Processing </a:t>
             </a:r>
             <a:r>
               <a:rPr lang="de-DE" dirty="0" err="1"/>
@@ -3991,15 +4326,15 @@
             </a:r>
             <a:r>
               <a:rPr lang="de-DE" i="1" dirty="0"/>
-              <a:t> 21st Annual Interna- </a:t>
-            </a:r>
-            <a:r>
-              <a:rPr lang="de-DE" i="1" dirty="0" err="1"/>
-              <a:t>tional</a:t>
+              <a:t> 21st Annual </a:t>
+            </a:r>
+            <a:r>
+              <a:rPr lang="de-DE" i="1" dirty="0" smtClean="0"/>
+              <a:t>International </a:t>
             </a:r>
             <a:r>
               <a:rPr lang="de-DE" i="1" dirty="0"/>
-              <a:t> Conference on Mobile Computing </a:t>
+              <a:t>Conference on Mobile Computing </a:t>
             </a:r>
             <a:r>
               <a:rPr lang="de-DE" i="1" dirty="0" err="1"/>
@@ -4013,6 +4348,98 @@
               <a:rPr lang="de-DE" dirty="0"/>
               <a:t>, pp. 251–253, 2015. </a:t>
             </a:r>
+            <a:endParaRPr lang="de-DE" dirty="0" smtClean="0"/>
+          </a:p>
+          <a:p>
+            <a:pPr lvl="1"/>
+            <a:r>
+              <a:rPr lang="de-DE" dirty="0" smtClean="0"/>
+              <a:t>[9] </a:t>
+            </a:r>
+            <a:r>
+              <a:rPr lang="de-DE" dirty="0"/>
+              <a:t>R. </a:t>
+            </a:r>
+            <a:r>
+              <a:rPr lang="de-DE" dirty="0" err="1"/>
+              <a:t>Poddar</a:t>
+            </a:r>
+            <a:r>
+              <a:rPr lang="de-DE" dirty="0"/>
+              <a:t>, T. B. </a:t>
+            </a:r>
+            <a:r>
+              <a:rPr lang="de-DE" dirty="0" err="1"/>
+              <a:t>Raluca</a:t>
+            </a:r>
+            <a:r>
+              <a:rPr lang="de-DE" dirty="0"/>
+              <a:t>, </a:t>
+            </a:r>
+            <a:r>
+              <a:rPr lang="de-DE" dirty="0" err="1"/>
+              <a:t>and</a:t>
+            </a:r>
+            <a:r>
+              <a:rPr lang="de-DE" dirty="0"/>
+              <a:t> A. </a:t>
+            </a:r>
+            <a:r>
+              <a:rPr lang="de-DE" dirty="0" err="1"/>
+              <a:t>Popa</a:t>
+            </a:r>
+            <a:r>
+              <a:rPr lang="de-DE" dirty="0"/>
+              <a:t>, “</a:t>
+            </a:r>
+            <a:r>
+              <a:rPr lang="de-DE" dirty="0" err="1"/>
+              <a:t>Arx</a:t>
+            </a:r>
+            <a:r>
+              <a:rPr lang="de-DE" dirty="0"/>
+              <a:t>: A </a:t>
+            </a:r>
+            <a:r>
+              <a:rPr lang="de-DE" dirty="0" err="1"/>
+              <a:t>Strongly</a:t>
+            </a:r>
+            <a:r>
+              <a:rPr lang="de-DE" dirty="0"/>
+              <a:t> </a:t>
+            </a:r>
+            <a:r>
+              <a:rPr lang="de-DE" dirty="0" err="1"/>
+              <a:t>Encrypted</a:t>
+            </a:r>
+            <a:r>
+              <a:rPr lang="de-DE" dirty="0"/>
+              <a:t> Database System,” </a:t>
+            </a:r>
+            <a:r>
+              <a:rPr lang="de-DE" i="1" dirty="0" err="1" smtClean="0"/>
+              <a:t>Cryptology</a:t>
+            </a:r>
+            <a:r>
+              <a:rPr lang="de-DE" i="1" dirty="0" smtClean="0"/>
+              <a:t> </a:t>
+            </a:r>
+            <a:r>
+              <a:rPr lang="de-DE" i="1" dirty="0" err="1"/>
+              <a:t>ePrint</a:t>
+            </a:r>
+            <a:r>
+              <a:rPr lang="de-DE" i="1" dirty="0"/>
+              <a:t> Archive: Report 2016/591</a:t>
+            </a:r>
+            <a:r>
+              <a:rPr lang="de-DE" dirty="0"/>
+              <a:t>, 2016. </a:t>
+            </a:r>
+            <a:endParaRPr lang="de-DE" dirty="0"/>
+          </a:p>
+          <a:p>
+            <a:pPr lvl="1"/>
             <a:endParaRPr lang="de-DE" dirty="0"/>
           </a:p>
           <a:p>
@@ -4239,11 +4666,7 @@
           <a:p>
             <a:r>
               <a:rPr lang="de-DE" dirty="0" smtClean="0"/>
-              <a:t>Rein kryptographischer </a:t>
-            </a:r>
-            <a:r>
-              <a:rPr lang="de-DE" dirty="0" smtClean="0"/>
-              <a:t>Ansatz</a:t>
+              <a:t>Rein kryptographischer Ansatz</a:t>
             </a:r>
           </a:p>
           <a:p>
@@ -4267,6 +4690,14 @@
               <a:rPr lang="de-DE" dirty="0" err="1" smtClean="0"/>
               <a:t>Talos</a:t>
             </a:r>
+            <a:endParaRPr lang="de-DE" dirty="0" smtClean="0"/>
+          </a:p>
+          <a:p>
+            <a:pPr lvl="1"/>
+            <a:r>
+              <a:rPr lang="de-DE" dirty="0" err="1" smtClean="0"/>
+              <a:t>Arx</a:t>
+            </a:r>
             <a:endParaRPr lang="de-DE" dirty="0"/>
           </a:p>
           <a:p>
@@ -4288,6 +4719,26 @@
             <a:r>
               <a:rPr lang="de-DE" dirty="0" err="1" smtClean="0"/>
               <a:t>Cipherbase</a:t>
+            </a:r>
+            <a:endParaRPr lang="de-DE" dirty="0" smtClean="0"/>
+          </a:p>
+          <a:p>
+            <a:pPr lvl="1"/>
+            <a:r>
+              <a:rPr lang="de-DE" dirty="0" err="1" smtClean="0"/>
+              <a:t>Verifiable</a:t>
+            </a:r>
+            <a:r>
+              <a:rPr lang="de-DE" dirty="0" smtClean="0"/>
+              <a:t> </a:t>
+            </a:r>
+            <a:r>
+              <a:rPr lang="de-DE" dirty="0" err="1" smtClean="0"/>
+              <a:t>Confidential</a:t>
+            </a:r>
+            <a:r>
+              <a:rPr lang="de-DE" dirty="0" smtClean="0"/>
+              <a:t> Cloud Computing (VC3) </a:t>
             </a:r>
             <a:endParaRPr lang="de-DE" dirty="0" smtClean="0"/>
           </a:p>
@@ -4351,11 +4802,7 @@
           <a:p>
             <a:r>
               <a:rPr lang="de-DE" noProof="0" dirty="0" smtClean="0"/>
-              <a:t>Rein kryptographischer </a:t>
-            </a:r>
-            <a:r>
-              <a:rPr lang="de-DE" noProof="0" dirty="0" smtClean="0"/>
-              <a:t>Ansatz</a:t>
+              <a:t>Rein kryptographischer Ansatz</a:t>
             </a:r>
             <a:endParaRPr lang="de-DE" noProof="0" dirty="0"/>
           </a:p>
@@ -4517,11 +4964,7 @@
             <a:pPr lvl="1"/>
             <a:r>
               <a:rPr lang="de-DE" dirty="0" smtClean="0"/>
-              <a:t>Mögliche Angriffe bekannt, welche Angreifern Zugriff aus sensitive Daten erlauben [2</a:t>
-            </a:r>
-            <a:r>
-              <a:rPr lang="de-DE" dirty="0" smtClean="0"/>
-              <a:t>]</a:t>
+              <a:t>Mögliche Angriffe bekannt, welche Angreifern Zugriff aus sensitive Daten erlauben [2]</a:t>
             </a:r>
           </a:p>
           <a:p>
@@ -4530,7 +4973,6 @@
               <a:rPr lang="de-DE" dirty="0" smtClean="0"/>
               <a:t>Keine Konfigurationsmöglichkeiten zum Maß an Sicherheit</a:t>
             </a:r>
-            <a:endParaRPr lang="de-DE" dirty="0" smtClean="0"/>
           </a:p>
         </p:txBody>
       </p:sp>
@@ -4791,17 +5233,214 @@
           <a:lstStyle/>
           <a:p>
             <a:r>
-              <a:rPr lang="de-DE" noProof="0" dirty="0" smtClean="0"/>
-              <a:t>Vertrauliche Hardware</a:t>
-            </a:r>
-            <a:endParaRPr lang="de-DE" noProof="0" dirty="0"/>
+              <a:rPr lang="de-DE" dirty="0" err="1" smtClean="0"/>
+              <a:t>Arx</a:t>
+            </a:r>
+            <a:endParaRPr lang="de-DE" dirty="0"/>
+          </a:p>
+        </p:txBody>
+      </p:sp>
+      <p:sp>
+        <p:nvSpPr>
+          <p:cNvPr id="3" name="Inhaltsplatzhalter 2"/>
+          <p:cNvSpPr>
+            <a:spLocks noGrp="1"/>
+          </p:cNvSpPr>
+          <p:nvPr>
+            <p:ph idx="1"/>
+          </p:nvPr>
+        </p:nvSpPr>
+        <p:spPr/>
+        <p:txBody>
+          <a:bodyPr/>
+          <a:lstStyle/>
+          <a:p>
+            <a:r>
+              <a:rPr lang="de-DE" dirty="0" smtClean="0"/>
+              <a:t>Ansatz</a:t>
+            </a:r>
+          </a:p>
+          <a:p>
+            <a:pPr lvl="1"/>
+            <a:r>
+              <a:rPr lang="de-DE" dirty="0" smtClean="0"/>
+              <a:t>Nachfolger von </a:t>
+            </a:r>
+            <a:r>
+              <a:rPr lang="de-DE" dirty="0" err="1" smtClean="0"/>
+              <a:t>CryptDB</a:t>
+            </a:r>
+            <a:r>
+              <a:rPr lang="de-DE" dirty="0"/>
+              <a:t> </a:t>
+            </a:r>
+            <a:r>
+              <a:rPr lang="de-DE" dirty="0" smtClean="0"/>
+              <a:t>mit dem Ziel die alten Schwächen zu beseitigen (keine Frequenzanalysen mehr bei OPE)</a:t>
+            </a:r>
+          </a:p>
+          <a:p>
+            <a:pPr lvl="1"/>
+            <a:r>
+              <a:rPr lang="de-DE" dirty="0" smtClean="0"/>
+              <a:t>Architektur unterscheidet sich durch nun zwei Proxys, jeweils auf Client- und Serverseite</a:t>
+            </a:r>
+          </a:p>
+          <a:p>
+            <a:pPr lvl="2"/>
+            <a:r>
+              <a:rPr lang="de-DE" dirty="0" smtClean="0"/>
+              <a:t>Clientproxy offenbart übliches Interface des DB Servers an die Anwendung, verschlüsselt </a:t>
+            </a:r>
+            <a:r>
+              <a:rPr lang="de-DE" dirty="0" err="1" smtClean="0"/>
+              <a:t>Queries</a:t>
+            </a:r>
+            <a:r>
+              <a:rPr lang="de-DE" dirty="0" smtClean="0"/>
+              <a:t>, enthält </a:t>
+            </a:r>
+            <a:r>
+              <a:rPr lang="de-DE" dirty="0" err="1" smtClean="0"/>
+              <a:t>Masterkey</a:t>
+            </a:r>
+            <a:endParaRPr lang="de-DE" dirty="0" smtClean="0"/>
+          </a:p>
+          <a:p>
+            <a:pPr lvl="2"/>
+            <a:r>
+              <a:rPr lang="de-DE" dirty="0" smtClean="0"/>
+              <a:t>Ausführung der </a:t>
+            </a:r>
+            <a:r>
+              <a:rPr lang="de-DE" dirty="0" err="1" smtClean="0"/>
+              <a:t>Queries</a:t>
+            </a:r>
+            <a:r>
+              <a:rPr lang="de-DE" dirty="0" smtClean="0"/>
+              <a:t> auf Serverproxy, enthält Indizes auf verschlüsselten Daten</a:t>
+            </a:r>
+          </a:p>
+          <a:p>
+            <a:pPr lvl="1"/>
+            <a:r>
+              <a:rPr lang="de-DE" dirty="0" smtClean="0"/>
+              <a:t>Konfigurierbarkeit: </a:t>
+            </a:r>
+            <a:r>
+              <a:rPr lang="de-DE" dirty="0"/>
+              <a:t>W</a:t>
+            </a:r>
+            <a:r>
+              <a:rPr lang="de-DE" dirty="0" smtClean="0"/>
+              <a:t>elche Spalten sollen verschlüsselt werden? Welche Operationen sollen auf verschlüsselten Daten laufen?</a:t>
+            </a:r>
+          </a:p>
+          <a:p>
+            <a:pPr lvl="1"/>
+            <a:r>
+              <a:rPr lang="de-DE" dirty="0" smtClean="0"/>
+              <a:t>Kern sind die zusätzlichen Indizes </a:t>
+            </a:r>
+            <a:r>
+              <a:rPr lang="de-DE" dirty="0" err="1" smtClean="0"/>
+              <a:t>Arx</a:t>
+            </a:r>
+            <a:r>
+              <a:rPr lang="de-DE" dirty="0" smtClean="0"/>
+              <a:t>-RANGE und </a:t>
+            </a:r>
+            <a:r>
+              <a:rPr lang="de-DE" dirty="0" err="1" smtClean="0"/>
+              <a:t>Arx</a:t>
+            </a:r>
+            <a:r>
+              <a:rPr lang="de-DE" dirty="0" smtClean="0"/>
+              <a:t>-EQ, die auf verschlüsselten Daten definiert sind, und nach Gebrauch stets erneuert werden müssen</a:t>
+            </a:r>
+          </a:p>
+          <a:p>
+            <a:r>
+              <a:rPr lang="de-DE" dirty="0" smtClean="0"/>
+              <a:t>Vorteile</a:t>
+            </a:r>
+          </a:p>
+          <a:p>
+            <a:pPr lvl="1"/>
+            <a:r>
+              <a:rPr lang="de-DE" dirty="0" smtClean="0"/>
+              <a:t>Signifikant hohe Sicherheit (vor allem gegenüber </a:t>
+            </a:r>
+            <a:r>
+              <a:rPr lang="de-DE" dirty="0" err="1" smtClean="0"/>
+              <a:t>CryptDB</a:t>
+            </a:r>
+            <a:r>
+              <a:rPr lang="de-DE" dirty="0" smtClean="0"/>
+              <a:t>) </a:t>
+            </a:r>
+            <a:r>
+              <a:rPr lang="de-DE" dirty="0" smtClean="0"/>
+              <a:t>[9]</a:t>
+            </a:r>
+            <a:endParaRPr lang="de-DE" dirty="0" smtClean="0"/>
+          </a:p>
+          <a:p>
+            <a:r>
+              <a:rPr lang="de-DE" dirty="0" smtClean="0"/>
+              <a:t>Nachteile</a:t>
+            </a:r>
+          </a:p>
+          <a:p>
+            <a:pPr lvl="1"/>
+            <a:r>
+              <a:rPr lang="de-DE" dirty="0" smtClean="0"/>
+              <a:t>Eingeschränkte Auswahl an Anfragen, vgl. </a:t>
+            </a:r>
+            <a:r>
+              <a:rPr lang="de-DE" dirty="0" err="1" smtClean="0"/>
+              <a:t>CryptDB</a:t>
+            </a:r>
+            <a:r>
+              <a:rPr lang="de-DE" dirty="0" smtClean="0"/>
+              <a:t> [9]</a:t>
+            </a:r>
+            <a:endParaRPr lang="de-DE" dirty="0" smtClean="0"/>
+          </a:p>
+          <a:p>
+            <a:pPr lvl="1"/>
+            <a:r>
+              <a:rPr lang="de-DE" dirty="0" smtClean="0"/>
+              <a:t>Gewissen </a:t>
+            </a:r>
+            <a:r>
+              <a:rPr lang="de-DE" dirty="0" err="1" smtClean="0"/>
+              <a:t>Queries</a:t>
+            </a:r>
+            <a:r>
+              <a:rPr lang="de-DE" dirty="0" smtClean="0"/>
+              <a:t> (Range </a:t>
+            </a:r>
+            <a:r>
+              <a:rPr lang="de-DE" dirty="0" err="1" smtClean="0"/>
+              <a:t>Queries</a:t>
+            </a:r>
+            <a:r>
+              <a:rPr lang="de-DE" dirty="0" smtClean="0"/>
+              <a:t>) langsamer zugunsten der </a:t>
+            </a:r>
+            <a:r>
+              <a:rPr lang="de-DE" dirty="0" smtClean="0"/>
+              <a:t>Sicherheit [9]</a:t>
+            </a:r>
+            <a:endParaRPr lang="de-DE" dirty="0" smtClean="0"/>
           </a:p>
         </p:txBody>
       </p:sp>
     </p:spTree>
     <p:extLst>
       <p:ext uri="{BB962C8B-B14F-4D97-AF65-F5344CB8AC3E}">
-        <p14:creationId xmlns:p14="http://schemas.microsoft.com/office/powerpoint/2010/main" val="2110267276"/>
+        <p14:creationId xmlns:p14="http://schemas.microsoft.com/office/powerpoint/2010/main" val="197685907"/>
       </p:ext>
     </p:extLst>
   </p:cSld>
@@ -4851,154 +5490,17 @@
           <a:lstStyle/>
           <a:p>
             <a:r>
-              <a:rPr lang="de-DE" dirty="0" err="1" smtClean="0"/>
-              <a:t>TrustedDB</a:t>
-            </a:r>
-            <a:endParaRPr lang="de-DE" dirty="0"/>
-          </a:p>
-        </p:txBody>
-      </p:sp>
-      <p:sp>
-        <p:nvSpPr>
-          <p:cNvPr id="3" name="Inhaltsplatzhalter 2"/>
-          <p:cNvSpPr>
-            <a:spLocks noGrp="1"/>
-          </p:cNvSpPr>
-          <p:nvPr>
-            <p:ph idx="1"/>
-          </p:nvPr>
-        </p:nvSpPr>
-        <p:spPr/>
-        <p:txBody>
-          <a:bodyPr/>
-          <a:lstStyle/>
-          <a:p>
-            <a:r>
-              <a:rPr lang="de-DE" dirty="0" smtClean="0"/>
-              <a:t>Ansatz</a:t>
-            </a:r>
-          </a:p>
-          <a:p>
-            <a:pPr lvl="1"/>
-            <a:r>
-              <a:rPr lang="de-DE" dirty="0" smtClean="0"/>
-              <a:t>Ähnlich </a:t>
-            </a:r>
-            <a:r>
-              <a:rPr lang="de-DE" dirty="0" err="1" smtClean="0"/>
-              <a:t>CryptDB</a:t>
-            </a:r>
-            <a:r>
-              <a:rPr lang="de-DE" dirty="0" smtClean="0"/>
-              <a:t>: </a:t>
-            </a:r>
-            <a:r>
-              <a:rPr lang="de-DE" dirty="0" smtClean="0"/>
-              <a:t>Datenbank ausgelagert, </a:t>
-            </a:r>
-            <a:r>
-              <a:rPr lang="de-DE" dirty="0" smtClean="0"/>
-              <a:t>SQL-Awareness</a:t>
-            </a:r>
-          </a:p>
-          <a:p>
-            <a:pPr lvl="1"/>
-            <a:r>
-              <a:rPr lang="de-DE" dirty="0" smtClean="0"/>
-              <a:t>Verarbeitung von vertraulichen Daten </a:t>
-            </a:r>
-            <a:r>
-              <a:rPr lang="de-DE" dirty="0" smtClean="0"/>
-              <a:t>auf </a:t>
-            </a:r>
-            <a:r>
-              <a:rPr lang="de-DE" dirty="0" smtClean="0"/>
-              <a:t>sicherem (kryptographischem) Coprozessor </a:t>
-            </a:r>
-            <a:r>
-              <a:rPr lang="de-DE" dirty="0" smtClean="0"/>
-              <a:t>(</a:t>
-            </a:r>
-            <a:r>
-              <a:rPr lang="de-DE" dirty="0" smtClean="0"/>
-              <a:t>SCPU)</a:t>
-            </a:r>
-          </a:p>
-          <a:p>
-            <a:r>
-              <a:rPr lang="de-DE" dirty="0" smtClean="0"/>
-              <a:t>Vorteile</a:t>
-            </a:r>
-          </a:p>
-          <a:p>
-            <a:pPr lvl="1"/>
-            <a:r>
-              <a:rPr lang="de-DE" dirty="0" smtClean="0"/>
-              <a:t>Höhere Performance als Softwarelösungen, </a:t>
-            </a:r>
-            <a:r>
-              <a:rPr lang="de-DE" dirty="0" smtClean="0"/>
-              <a:t>durch </a:t>
-            </a:r>
-            <a:r>
-              <a:rPr lang="de-DE" dirty="0" smtClean="0"/>
-              <a:t>schnellere kryptografische Verarbeitung [3]</a:t>
-            </a:r>
-          </a:p>
-          <a:p>
-            <a:r>
-              <a:rPr lang="de-DE" dirty="0" smtClean="0"/>
-              <a:t>Nachteile</a:t>
-            </a:r>
-          </a:p>
-          <a:p>
-            <a:pPr lvl="1"/>
-            <a:r>
-              <a:rPr lang="de-DE" dirty="0" smtClean="0"/>
-              <a:t>In kleineren/mittleren Systemen nicht lohnenswert, aufgrund Kosten sicherer </a:t>
-            </a:r>
-            <a:r>
-              <a:rPr lang="de-DE" dirty="0" smtClean="0"/>
-              <a:t>Hardware</a:t>
-            </a:r>
-          </a:p>
-          <a:p>
-            <a:pPr lvl="1"/>
-            <a:r>
-              <a:rPr lang="de-DE" dirty="0" smtClean="0"/>
-              <a:t>Gesamtes DBS ist </a:t>
-            </a:r>
-            <a:r>
-              <a:rPr lang="de-DE" dirty="0" err="1" smtClean="0"/>
-              <a:t>Trusted</a:t>
-            </a:r>
-            <a:r>
-              <a:rPr lang="de-DE" dirty="0" smtClean="0"/>
-              <a:t> Computing Base (TCB) [5]</a:t>
-            </a:r>
-          </a:p>
-          <a:p>
-            <a:pPr lvl="1"/>
-            <a:r>
-              <a:rPr lang="de-DE" dirty="0" smtClean="0"/>
-              <a:t>Einschränkungen erzwingen die Nutzung einer </a:t>
-            </a:r>
-            <a:r>
-              <a:rPr lang="de-DE" dirty="0" err="1" smtClean="0"/>
-              <a:t>SQLite</a:t>
-            </a:r>
-            <a:r>
-              <a:rPr lang="de-DE" dirty="0" smtClean="0"/>
-              <a:t> Datenbank in SCPU, mit eingeschränkter Funktionalität [5]</a:t>
-            </a:r>
-            <a:endParaRPr lang="de-DE" dirty="0" smtClean="0"/>
+              <a:rPr lang="de-DE" noProof="0" dirty="0" smtClean="0"/>
+              <a:t>Vertrauliche Hardware</a:t>
+            </a:r>
+            <a:endParaRPr lang="de-DE" noProof="0" dirty="0"/>
           </a:p>
         </p:txBody>
       </p:sp>
     </p:spTree>
     <p:extLst>
       <p:ext uri="{BB962C8B-B14F-4D97-AF65-F5344CB8AC3E}">
-        <p14:creationId xmlns:p14="http://schemas.microsoft.com/office/powerpoint/2010/main" val="891291495"/>
+        <p14:creationId xmlns:p14="http://schemas.microsoft.com/office/powerpoint/2010/main" val="2110267276"/>
       </p:ext>
     </p:extLst>
   </p:cSld>
@@ -5049,7 +5551,7 @@
           <a:p>
             <a:r>
               <a:rPr lang="de-DE" dirty="0" err="1" smtClean="0"/>
-              <a:t>Cipherbase</a:t>
+              <a:t>TrustedDB</a:t>
             </a:r>
             <a:endParaRPr lang="de-DE" dirty="0"/>
           </a:p>
@@ -5079,23 +5581,55 @@
             <a:pPr lvl="1"/>
             <a:r>
               <a:rPr lang="de-DE" dirty="0" smtClean="0"/>
-              <a:t>Erweiterung für Microsoft SQL Server</a:t>
-            </a:r>
-            <a:endParaRPr lang="de-DE" dirty="0" smtClean="0"/>
-          </a:p>
-          <a:p>
-            <a:pPr lvl="1"/>
-            <a:r>
-              <a:rPr lang="de-DE" dirty="0" smtClean="0"/>
-              <a:t>HW/SW </a:t>
+              <a:t>Ähnlich </a:t>
             </a:r>
             <a:r>
               <a:rPr lang="de-DE" dirty="0" err="1" smtClean="0"/>
-              <a:t>Codesign</a:t>
-            </a:r>
-            <a:r>
-              <a:rPr lang="de-DE" dirty="0" smtClean="0"/>
-              <a:t>: Separate „</a:t>
+              <a:t>CryptDB</a:t>
+            </a:r>
+            <a:r>
+              <a:rPr lang="de-DE" dirty="0" smtClean="0"/>
+              <a:t>: Datenbank ausgelagert, SQL-Awareness</a:t>
+            </a:r>
+          </a:p>
+          <a:p>
+            <a:pPr lvl="1"/>
+            <a:r>
+              <a:rPr lang="de-DE" dirty="0" smtClean="0"/>
+              <a:t>Verarbeitung von vertraulichen Daten auf sicherem (kryptographischem) Coprozessor (SCPU)</a:t>
+            </a:r>
+          </a:p>
+          <a:p>
+            <a:r>
+              <a:rPr lang="de-DE" dirty="0" smtClean="0"/>
+              <a:t>Vorteile</a:t>
+            </a:r>
+          </a:p>
+          <a:p>
+            <a:pPr lvl="1"/>
+            <a:r>
+              <a:rPr lang="de-DE" dirty="0" smtClean="0"/>
+              <a:t>Höhere Performance als Softwarelösungen, durch schnellere kryptografische Verarbeitung [3]</a:t>
+            </a:r>
+          </a:p>
+          <a:p>
+            <a:r>
+              <a:rPr lang="de-DE" dirty="0" smtClean="0"/>
+              <a:t>Nachteile</a:t>
+            </a:r>
+          </a:p>
+          <a:p>
+            <a:pPr lvl="1"/>
+            <a:r>
+              <a:rPr lang="de-DE" dirty="0" smtClean="0"/>
+              <a:t>In kleineren/mittleren Systemen nicht lohnenswert, aufgrund Kosten sicherer Hardware</a:t>
+            </a:r>
+          </a:p>
+          <a:p>
+            <a:pPr lvl="1"/>
+            <a:r>
+              <a:rPr lang="de-DE" dirty="0" smtClean="0"/>
+              <a:t>Gesamtes DBS ist </a:t>
             </a:r>
             <a:r>
               <a:rPr lang="de-DE" dirty="0" err="1" smtClean="0"/>
@@ -5103,113 +5637,30 @@
             </a:r>
             <a:r>
               <a:rPr lang="de-DE" dirty="0" smtClean="0"/>
-              <a:t> </a:t>
+              <a:t> Computing Base (TCB) [5]</a:t>
+            </a:r>
+          </a:p>
+          <a:p>
+            <a:pPr lvl="1"/>
+            <a:r>
+              <a:rPr lang="de-DE" dirty="0" smtClean="0"/>
+              <a:t>Einschränkungen erzwingen die Nutzung einer </a:t>
             </a:r>
             <a:r>
               <a:rPr lang="de-DE" dirty="0" err="1" smtClean="0"/>
-              <a:t>Machine</a:t>
-            </a:r>
-            <a:r>
-              <a:rPr lang="de-DE" dirty="0" smtClean="0"/>
-              <a:t>“ (TM) zum Zweck der Berechnung von kryptographischen Primitiven</a:t>
-            </a:r>
-          </a:p>
-          <a:p>
-            <a:pPr lvl="1"/>
-            <a:r>
-              <a:rPr lang="de-DE" dirty="0" smtClean="0"/>
-              <a:t>Prinzipiell gleich zu </a:t>
-            </a:r>
-            <a:r>
-              <a:rPr lang="de-DE" dirty="0" err="1" smtClean="0"/>
-              <a:t>TrustedDB</a:t>
-            </a:r>
-            <a:r>
-              <a:rPr lang="de-DE" dirty="0" smtClean="0"/>
-              <a:t>, Logik in vertrauenswürdiger Hardware aber nur simple </a:t>
-            </a:r>
-            <a:r>
-              <a:rPr lang="de-DE" dirty="0" err="1" smtClean="0"/>
-              <a:t>Stackmaschine</a:t>
-            </a:r>
-            <a:endParaRPr lang="de-DE" dirty="0" smtClean="0"/>
-          </a:p>
-          <a:p>
-            <a:pPr lvl="1"/>
-            <a:r>
-              <a:rPr lang="de-DE" dirty="0" smtClean="0"/>
-              <a:t>Umsetzung der TM durch FPGAs möglich [5]</a:t>
-            </a:r>
-          </a:p>
-          <a:p>
-            <a:r>
-              <a:rPr lang="de-DE" dirty="0" smtClean="0"/>
-              <a:t>Vorteile</a:t>
-            </a:r>
-            <a:endParaRPr lang="de-DE" dirty="0" smtClean="0"/>
-          </a:p>
-          <a:p>
-            <a:pPr lvl="1"/>
-            <a:r>
-              <a:rPr lang="de-DE" dirty="0" smtClean="0"/>
-              <a:t>Maß an Sicherheit ist für einzelne Attribute konfigurierbar (nicht bei </a:t>
-            </a:r>
-            <a:r>
-              <a:rPr lang="de-DE" dirty="0" err="1" smtClean="0"/>
-              <a:t>CryptDB</a:t>
-            </a:r>
-            <a:r>
-              <a:rPr lang="de-DE" dirty="0" smtClean="0"/>
-              <a:t>) [4]</a:t>
-            </a:r>
-          </a:p>
-          <a:p>
-            <a:pPr lvl="1"/>
-            <a:r>
-              <a:rPr lang="de-DE" dirty="0" smtClean="0"/>
-              <a:t>Hohe Kopplung: TM berechnet nur die Kernprimitive die wirklich auf Verschlüsselung beruhen, nicht mehr (nicht bei </a:t>
-            </a:r>
-            <a:r>
-              <a:rPr lang="de-DE" dirty="0" err="1" smtClean="0"/>
-              <a:t>TrustedDB</a:t>
-            </a:r>
-            <a:r>
-              <a:rPr lang="de-DE" dirty="0" smtClean="0"/>
-              <a:t>) [4]</a:t>
-            </a:r>
-          </a:p>
-          <a:p>
-            <a:pPr lvl="1"/>
-            <a:r>
-              <a:rPr lang="de-DE" dirty="0" err="1" smtClean="0"/>
-              <a:t>Trusted</a:t>
-            </a:r>
-            <a:r>
-              <a:rPr lang="de-DE" dirty="0" smtClean="0"/>
-              <a:t> Computing Base (TCB) sehr klein [5]</a:t>
-            </a:r>
-            <a:endParaRPr lang="de-DE" dirty="0" smtClean="0"/>
-          </a:p>
-          <a:p>
-            <a:r>
-              <a:rPr lang="de-DE" dirty="0" smtClean="0"/>
-              <a:t>Nachteile</a:t>
-            </a:r>
-          </a:p>
-          <a:p>
-            <a:pPr lvl="1"/>
-            <a:r>
-              <a:rPr lang="de-DE" dirty="0" smtClean="0"/>
-              <a:t>Gleiche Vertraulichkeit wie OPE, Ordnung der Daten wird preisgegeben [6]</a:t>
-            </a:r>
-            <a:endParaRPr lang="de-DE" dirty="0" smtClean="0"/>
+              <a:t>SQLite</a:t>
+            </a:r>
+            <a:r>
+              <a:rPr lang="de-DE" dirty="0" smtClean="0"/>
+              <a:t> Datenbank in SCPU, mit eingeschränkter Funktionalität [5]</a:t>
+            </a:r>
           </a:p>
         </p:txBody>
       </p:sp>
     </p:spTree>
     <p:extLst>
       <p:ext uri="{BB962C8B-B14F-4D97-AF65-F5344CB8AC3E}">
-        <p14:creationId xmlns:p14="http://schemas.microsoft.com/office/powerpoint/2010/main" val="626197437"/>
+        <p14:creationId xmlns:p14="http://schemas.microsoft.com/office/powerpoint/2010/main" val="891291495"/>
       </p:ext>
     </p:extLst>
   </p:cSld>

</xml_diff>

<commit_message>
Completed prototype of foundations chapter
</commit_message>
<xml_diff>
--- a/Dokument/Entwürfe/02 Verwandte Arbeiten.pptx
+++ b/Dokument/Entwürfe/02 Verwandte Arbeiten.pptx
@@ -4265,16 +4265,20 @@
               <a:t> W. Hu, “Poster: </a:t>
             </a:r>
             <a:r>
-              <a:rPr lang="de-DE" err="1"/>
+              <a:rPr lang="de-DE" dirty="0" err="1"/>
               <a:t>Towards</a:t>
             </a:r>
             <a:r>
-              <a:rPr lang="de-DE"/>
+              <a:rPr lang="de-DE" dirty="0"/>
               <a:t> </a:t>
             </a:r>
             <a:r>
-              <a:rPr lang="de-DE" smtClean="0"/>
-              <a:t>Encrypted </a:t>
+              <a:rPr lang="de-DE" dirty="0" err="1" smtClean="0"/>
+              <a:t>Encrypted</a:t>
+            </a:r>
+            <a:r>
+              <a:rPr lang="de-DE" dirty="0" smtClean="0"/>
+              <a:t> </a:t>
             </a:r>
             <a:r>
               <a:rPr lang="de-DE" dirty="0"/>
@@ -4894,15 +4898,24 @@
             <a:pPr lvl="1"/>
             <a:r>
               <a:rPr lang="de-DE" dirty="0" smtClean="0"/>
-              <a:t>Proxy zwischen Client und Server übersetzt</a:t>
+              <a:t>Proxy zwischen Client und Server </a:t>
+            </a:r>
+            <a:r>
+              <a:rPr lang="de-DE" dirty="0" smtClean="0"/>
+              <a:t>übersetzt</a:t>
             </a:r>
           </a:p>
           <a:p>
             <a:pPr lvl="2"/>
             <a:r>
               <a:rPr lang="de-DE" dirty="0" smtClean="0"/>
-              <a:t>Anfragen des Client in verschlüsselte Form</a:t>
-            </a:r>
+              <a:t>Anfragen des Client </a:t>
+            </a:r>
+            <a:r>
+              <a:rPr lang="de-DE" smtClean="0"/>
+              <a:t>in optimierte Form</a:t>
+            </a:r>
+            <a:endParaRPr lang="de-DE" dirty="0" smtClean="0"/>
           </a:p>
           <a:p>
             <a:pPr lvl="2"/>
@@ -4915,7 +4928,11 @@
             <a:pPr lvl="1"/>
             <a:r>
               <a:rPr lang="de-DE" dirty="0" smtClean="0"/>
-              <a:t>Spezielles Verschlüsselungsschema (SQL-aware </a:t>
+              <a:t>Spezielles </a:t>
+            </a:r>
+            <a:r>
+              <a:rPr lang="de-DE" dirty="0" smtClean="0"/>
+              <a:t>Verschlüsselungsschema (SQL-aware </a:t>
             </a:r>
             <a:r>
               <a:rPr lang="de-DE" dirty="0" err="1" smtClean="0"/>

</xml_diff>